<commit_message>
Update Capstone Project Presentation.pptx
</commit_message>
<xml_diff>
--- a/Capstone Project Presentation.pptx
+++ b/Capstone Project Presentation.pptx
@@ -280,7 +280,7 @@
           <a:p>
             <a:fld id="{178A9DC8-BCBD-4C22-8E04-C5B5B62129CD}" type="datetimeFigureOut">
               <a:rPr lang="en-VC" smtClean="0"/>
-              <a:t>18/05/2024</a:t>
+              <a:t>26/05/2024</a:t>
             </a:fld>
             <a:endParaRPr lang="en-VC"/>
           </a:p>
@@ -480,7 +480,7 @@
           <a:p>
             <a:fld id="{178A9DC8-BCBD-4C22-8E04-C5B5B62129CD}" type="datetimeFigureOut">
               <a:rPr lang="en-VC" smtClean="0"/>
-              <a:t>18/05/2024</a:t>
+              <a:t>26/05/2024</a:t>
             </a:fld>
             <a:endParaRPr lang="en-VC"/>
           </a:p>
@@ -690,7 +690,7 @@
           <a:p>
             <a:fld id="{178A9DC8-BCBD-4C22-8E04-C5B5B62129CD}" type="datetimeFigureOut">
               <a:rPr lang="en-VC" smtClean="0"/>
-              <a:t>18/05/2024</a:t>
+              <a:t>26/05/2024</a:t>
             </a:fld>
             <a:endParaRPr lang="en-VC"/>
           </a:p>
@@ -890,7 +890,7 @@
           <a:p>
             <a:fld id="{178A9DC8-BCBD-4C22-8E04-C5B5B62129CD}" type="datetimeFigureOut">
               <a:rPr lang="en-VC" smtClean="0"/>
-              <a:t>18/05/2024</a:t>
+              <a:t>26/05/2024</a:t>
             </a:fld>
             <a:endParaRPr lang="en-VC"/>
           </a:p>
@@ -1166,7 +1166,7 @@
           <a:p>
             <a:fld id="{178A9DC8-BCBD-4C22-8E04-C5B5B62129CD}" type="datetimeFigureOut">
               <a:rPr lang="en-VC" smtClean="0"/>
-              <a:t>18/05/2024</a:t>
+              <a:t>26/05/2024</a:t>
             </a:fld>
             <a:endParaRPr lang="en-VC"/>
           </a:p>
@@ -1434,7 +1434,7 @@
           <a:p>
             <a:fld id="{178A9DC8-BCBD-4C22-8E04-C5B5B62129CD}" type="datetimeFigureOut">
               <a:rPr lang="en-VC" smtClean="0"/>
-              <a:t>18/05/2024</a:t>
+              <a:t>26/05/2024</a:t>
             </a:fld>
             <a:endParaRPr lang="en-VC"/>
           </a:p>
@@ -1849,7 +1849,7 @@
           <a:p>
             <a:fld id="{178A9DC8-BCBD-4C22-8E04-C5B5B62129CD}" type="datetimeFigureOut">
               <a:rPr lang="en-VC" smtClean="0"/>
-              <a:t>18/05/2024</a:t>
+              <a:t>26/05/2024</a:t>
             </a:fld>
             <a:endParaRPr lang="en-VC"/>
           </a:p>
@@ -1991,7 +1991,7 @@
           <a:p>
             <a:fld id="{178A9DC8-BCBD-4C22-8E04-C5B5B62129CD}" type="datetimeFigureOut">
               <a:rPr lang="en-VC" smtClean="0"/>
-              <a:t>18/05/2024</a:t>
+              <a:t>26/05/2024</a:t>
             </a:fld>
             <a:endParaRPr lang="en-VC"/>
           </a:p>
@@ -2104,7 +2104,7 @@
           <a:p>
             <a:fld id="{178A9DC8-BCBD-4C22-8E04-C5B5B62129CD}" type="datetimeFigureOut">
               <a:rPr lang="en-VC" smtClean="0"/>
-              <a:t>18/05/2024</a:t>
+              <a:t>26/05/2024</a:t>
             </a:fld>
             <a:endParaRPr lang="en-VC"/>
           </a:p>
@@ -2417,7 +2417,7 @@
           <a:p>
             <a:fld id="{178A9DC8-BCBD-4C22-8E04-C5B5B62129CD}" type="datetimeFigureOut">
               <a:rPr lang="en-VC" smtClean="0"/>
-              <a:t>18/05/2024</a:t>
+              <a:t>26/05/2024</a:t>
             </a:fld>
             <a:endParaRPr lang="en-VC"/>
           </a:p>
@@ -2706,7 +2706,7 @@
           <a:p>
             <a:fld id="{178A9DC8-BCBD-4C22-8E04-C5B5B62129CD}" type="datetimeFigureOut">
               <a:rPr lang="en-VC" smtClean="0"/>
-              <a:t>18/05/2024</a:t>
+              <a:t>26/05/2024</a:t>
             </a:fld>
             <a:endParaRPr lang="en-VC"/>
           </a:p>
@@ -2949,7 +2949,7 @@
           <a:p>
             <a:fld id="{178A9DC8-BCBD-4C22-8E04-C5B5B62129CD}" type="datetimeFigureOut">
               <a:rPr lang="en-VC" smtClean="0"/>
-              <a:t>18/05/2024</a:t>
+              <a:t>26/05/2024</a:t>
             </a:fld>
             <a:endParaRPr lang="en-VC"/>
           </a:p>
@@ -4971,7 +4971,7 @@
                 <a:effectLst/>
                 <a:latin typeface="Söhne"/>
               </a:rPr>
-              <a:t>SVM model demonstrate a high accuracy rate of (0.80%) in predicting churn based on my validation tests</a:t>
+              <a:t>Xgboost model demonstrate a high F1 score of (0. 72%) in predicting churn based on my validation tests</a:t>
             </a:r>
           </a:p>
           <a:p>
@@ -6491,7 +6491,7 @@
           <a:graphicData uri="http://schemas.openxmlformats.org/presentationml/2006/ole">
             <mc:AlternateContent xmlns:mc="http://schemas.openxmlformats.org/markup-compatibility/2006">
               <mc:Choice xmlns:v="urn:schemas-microsoft-com:vml" Requires="v">
-                <p:oleObj spid="_x0000_s6152" name="Worksheet" r:id="rId3" imgW="11592027" imgH="6105552" progId="Excel.Sheet.12">
+                <p:oleObj spid="_x0000_s6154" name="Worksheet" r:id="rId3" imgW="11592027" imgH="6105552" progId="Excel.Sheet.12">
                   <p:link updateAutomatic="1"/>
                 </p:oleObj>
               </mc:Choice>
@@ -6614,7 +6614,7 @@
           <a:graphicData uri="http://schemas.openxmlformats.org/presentationml/2006/ole">
             <mc:AlternateContent xmlns:mc="http://schemas.openxmlformats.org/markup-compatibility/2006">
               <mc:Choice xmlns:v="urn:schemas-microsoft-com:vml" Requires="v">
-                <p:oleObj spid="_x0000_s7176" name="Worksheet" r:id="rId3" imgW="11915793" imgH="6105552" progId="Excel.Sheet.12">
+                <p:oleObj spid="_x0000_s7178" name="Worksheet" r:id="rId3" imgW="11915793" imgH="6105552" progId="Excel.Sheet.12">
                   <p:link updateAutomatic="1"/>
                 </p:oleObj>
               </mc:Choice>

</xml_diff>